<commit_message>
updated bug in slide 10 of sql adventure.
plus some web api tutorial stuff.
</commit_message>
<xml_diff>
--- a/Tutorials/NetTodoApp-Part1-BlazorWASM/Resources/Architecture.pptx
+++ b/Tutorials/NetTodoApp-Part1-BlazorWASM/Resources/Architecture.pptx
@@ -263,7 +263,7 @@
           <a:p>
             <a:fld id="{ACCBDB6E-0703-4FBB-B812-31F8EA23C7EF}" type="datetimeFigureOut">
               <a:rPr lang="en-GB" smtClean="0"/>
-              <a:t>25/08/2022</a:t>
+              <a:t>29/08/2022</a:t>
             </a:fld>
             <a:endParaRPr lang="en-GB"/>
           </a:p>
@@ -463,7 +463,7 @@
           <a:p>
             <a:fld id="{ACCBDB6E-0703-4FBB-B812-31F8EA23C7EF}" type="datetimeFigureOut">
               <a:rPr lang="en-GB" smtClean="0"/>
-              <a:t>25/08/2022</a:t>
+              <a:t>29/08/2022</a:t>
             </a:fld>
             <a:endParaRPr lang="en-GB"/>
           </a:p>
@@ -673,7 +673,7 @@
           <a:p>
             <a:fld id="{ACCBDB6E-0703-4FBB-B812-31F8EA23C7EF}" type="datetimeFigureOut">
               <a:rPr lang="en-GB" smtClean="0"/>
-              <a:t>25/08/2022</a:t>
+              <a:t>29/08/2022</a:t>
             </a:fld>
             <a:endParaRPr lang="en-GB"/>
           </a:p>
@@ -873,7 +873,7 @@
           <a:p>
             <a:fld id="{ACCBDB6E-0703-4FBB-B812-31F8EA23C7EF}" type="datetimeFigureOut">
               <a:rPr lang="en-GB" smtClean="0"/>
-              <a:t>25/08/2022</a:t>
+              <a:t>29/08/2022</a:t>
             </a:fld>
             <a:endParaRPr lang="en-GB"/>
           </a:p>
@@ -1149,7 +1149,7 @@
           <a:p>
             <a:fld id="{ACCBDB6E-0703-4FBB-B812-31F8EA23C7EF}" type="datetimeFigureOut">
               <a:rPr lang="en-GB" smtClean="0"/>
-              <a:t>25/08/2022</a:t>
+              <a:t>29/08/2022</a:t>
             </a:fld>
             <a:endParaRPr lang="en-GB"/>
           </a:p>
@@ -1417,7 +1417,7 @@
           <a:p>
             <a:fld id="{ACCBDB6E-0703-4FBB-B812-31F8EA23C7EF}" type="datetimeFigureOut">
               <a:rPr lang="en-GB" smtClean="0"/>
-              <a:t>25/08/2022</a:t>
+              <a:t>29/08/2022</a:t>
             </a:fld>
             <a:endParaRPr lang="en-GB"/>
           </a:p>
@@ -1832,7 +1832,7 @@
           <a:p>
             <a:fld id="{ACCBDB6E-0703-4FBB-B812-31F8EA23C7EF}" type="datetimeFigureOut">
               <a:rPr lang="en-GB" smtClean="0"/>
-              <a:t>25/08/2022</a:t>
+              <a:t>29/08/2022</a:t>
             </a:fld>
             <a:endParaRPr lang="en-GB"/>
           </a:p>
@@ -1974,7 +1974,7 @@
           <a:p>
             <a:fld id="{ACCBDB6E-0703-4FBB-B812-31F8EA23C7EF}" type="datetimeFigureOut">
               <a:rPr lang="en-GB" smtClean="0"/>
-              <a:t>25/08/2022</a:t>
+              <a:t>29/08/2022</a:t>
             </a:fld>
             <a:endParaRPr lang="en-GB"/>
           </a:p>
@@ -2087,7 +2087,7 @@
           <a:p>
             <a:fld id="{ACCBDB6E-0703-4FBB-B812-31F8EA23C7EF}" type="datetimeFigureOut">
               <a:rPr lang="en-GB" smtClean="0"/>
-              <a:t>25/08/2022</a:t>
+              <a:t>29/08/2022</a:t>
             </a:fld>
             <a:endParaRPr lang="en-GB"/>
           </a:p>
@@ -2400,7 +2400,7 @@
           <a:p>
             <a:fld id="{ACCBDB6E-0703-4FBB-B812-31F8EA23C7EF}" type="datetimeFigureOut">
               <a:rPr lang="en-GB" smtClean="0"/>
-              <a:t>25/08/2022</a:t>
+              <a:t>29/08/2022</a:t>
             </a:fld>
             <a:endParaRPr lang="en-GB"/>
           </a:p>
@@ -2689,7 +2689,7 @@
           <a:p>
             <a:fld id="{ACCBDB6E-0703-4FBB-B812-31F8EA23C7EF}" type="datetimeFigureOut">
               <a:rPr lang="en-GB" smtClean="0"/>
-              <a:t>25/08/2022</a:t>
+              <a:t>29/08/2022</a:t>
             </a:fld>
             <a:endParaRPr lang="en-GB"/>
           </a:p>
@@ -2932,7 +2932,7 @@
           <a:p>
             <a:fld id="{ACCBDB6E-0703-4FBB-B812-31F8EA23C7EF}" type="datetimeFigureOut">
               <a:rPr lang="en-GB" smtClean="0"/>
-              <a:t>25/08/2022</a:t>
+              <a:t>29/08/2022</a:t>
             </a:fld>
             <a:endParaRPr lang="en-GB"/>
           </a:p>
@@ -4696,6 +4696,408 @@
           <a:chExt cx="0" cy="0"/>
         </a:xfrm>
       </p:grpSpPr>
+      <p:sp>
+        <p:nvSpPr>
+          <p:cNvPr id="4" name="Rectangle: Rounded Corners 3">
+            <a:extLst>
+              <a:ext uri="{FF2B5EF4-FFF2-40B4-BE49-F238E27FC236}">
+                <a16:creationId xmlns:a16="http://schemas.microsoft.com/office/drawing/2014/main" id="{B1EA98D5-ADDD-434C-B7E6-33A5C4B25646}"/>
+              </a:ext>
+            </a:extLst>
+          </p:cNvPr>
+          <p:cNvSpPr/>
+          <p:nvPr/>
+        </p:nvSpPr>
+        <p:spPr>
+          <a:xfrm>
+            <a:off x="4021585" y="2766135"/>
+            <a:ext cx="3400147" cy="506027"/>
+          </a:xfrm>
+          <a:prstGeom prst="roundRect">
+            <a:avLst/>
+          </a:prstGeom>
+          <a:solidFill>
+            <a:schemeClr val="accent6">
+              <a:lumMod val="20000"/>
+              <a:lumOff val="80000"/>
+            </a:schemeClr>
+          </a:solidFill>
+          <a:ln>
+            <a:solidFill>
+              <a:schemeClr val="accent6"/>
+            </a:solidFill>
+          </a:ln>
+        </p:spPr>
+        <p:style>
+          <a:lnRef idx="2">
+            <a:schemeClr val="accent1">
+              <a:shade val="50000"/>
+            </a:schemeClr>
+          </a:lnRef>
+          <a:fillRef idx="1">
+            <a:schemeClr val="accent1"/>
+          </a:fillRef>
+          <a:effectRef idx="0">
+            <a:schemeClr val="accent1"/>
+          </a:effectRef>
+          <a:fontRef idx="minor">
+            <a:schemeClr val="lt1"/>
+          </a:fontRef>
+        </p:style>
+        <p:txBody>
+          <a:bodyPr rtlCol="0" anchor="ctr"/>
+          <a:lstStyle/>
+          <a:p>
+            <a:pPr algn="ctr"/>
+            <a:r>
+              <a:rPr lang="da-DK" dirty="0">
+                <a:solidFill>
+                  <a:schemeClr val="tx1"/>
+                </a:solidFill>
+              </a:rPr>
+              <a:t>REST Controllers</a:t>
+            </a:r>
+            <a:endParaRPr lang="en-GB" dirty="0">
+              <a:solidFill>
+                <a:schemeClr val="tx1"/>
+              </a:solidFill>
+            </a:endParaRPr>
+          </a:p>
+        </p:txBody>
+      </p:sp>
+      <p:sp>
+        <p:nvSpPr>
+          <p:cNvPr id="6" name="Rectangle: Rounded Corners 5">
+            <a:extLst>
+              <a:ext uri="{FF2B5EF4-FFF2-40B4-BE49-F238E27FC236}">
+                <a16:creationId xmlns:a16="http://schemas.microsoft.com/office/drawing/2014/main" id="{C0BD76BD-27E5-4EF7-90E2-6CF55C9D5B3F}"/>
+              </a:ext>
+            </a:extLst>
+          </p:cNvPr>
+          <p:cNvSpPr/>
+          <p:nvPr/>
+        </p:nvSpPr>
+        <p:spPr>
+          <a:xfrm>
+            <a:off x="4021581" y="3332825"/>
+            <a:ext cx="3400147" cy="506027"/>
+          </a:xfrm>
+          <a:prstGeom prst="roundRect">
+            <a:avLst/>
+          </a:prstGeom>
+          <a:solidFill>
+            <a:schemeClr val="accent6">
+              <a:lumMod val="40000"/>
+              <a:lumOff val="60000"/>
+            </a:schemeClr>
+          </a:solidFill>
+          <a:ln>
+            <a:solidFill>
+              <a:schemeClr val="accent6"/>
+            </a:solidFill>
+          </a:ln>
+        </p:spPr>
+        <p:style>
+          <a:lnRef idx="2">
+            <a:schemeClr val="accent1">
+              <a:shade val="50000"/>
+            </a:schemeClr>
+          </a:lnRef>
+          <a:fillRef idx="1">
+            <a:schemeClr val="accent1"/>
+          </a:fillRef>
+          <a:effectRef idx="0">
+            <a:schemeClr val="accent1"/>
+          </a:effectRef>
+          <a:fontRef idx="minor">
+            <a:schemeClr val="lt1"/>
+          </a:fontRef>
+        </p:style>
+        <p:txBody>
+          <a:bodyPr rtlCol="0" anchor="ctr"/>
+          <a:lstStyle/>
+          <a:p>
+            <a:pPr algn="ctr"/>
+            <a:r>
+              <a:rPr lang="da-DK" dirty="0">
+                <a:solidFill>
+                  <a:schemeClr val="tx1"/>
+                </a:solidFill>
+              </a:rPr>
+              <a:t>Domain </a:t>
+            </a:r>
+            <a:r>
+              <a:rPr lang="da-DK" dirty="0" err="1">
+                <a:solidFill>
+                  <a:schemeClr val="tx1"/>
+                </a:solidFill>
+              </a:rPr>
+              <a:t>logic</a:t>
+            </a:r>
+            <a:endParaRPr lang="en-GB" dirty="0">
+              <a:solidFill>
+                <a:schemeClr val="tx1"/>
+              </a:solidFill>
+            </a:endParaRPr>
+          </a:p>
+        </p:txBody>
+      </p:sp>
+      <p:sp>
+        <p:nvSpPr>
+          <p:cNvPr id="8" name="Rectangle: Rounded Corners 7">
+            <a:extLst>
+              <a:ext uri="{FF2B5EF4-FFF2-40B4-BE49-F238E27FC236}">
+                <a16:creationId xmlns:a16="http://schemas.microsoft.com/office/drawing/2014/main" id="{901A162A-96F5-4996-9260-5594651E63A2}"/>
+              </a:ext>
+            </a:extLst>
+          </p:cNvPr>
+          <p:cNvSpPr/>
+          <p:nvPr/>
+        </p:nvSpPr>
+        <p:spPr>
+          <a:xfrm>
+            <a:off x="4021581" y="3899515"/>
+            <a:ext cx="3400147" cy="506027"/>
+          </a:xfrm>
+          <a:prstGeom prst="roundRect">
+            <a:avLst/>
+          </a:prstGeom>
+          <a:solidFill>
+            <a:schemeClr val="accent6">
+              <a:lumMod val="60000"/>
+              <a:lumOff val="40000"/>
+            </a:schemeClr>
+          </a:solidFill>
+          <a:ln>
+            <a:solidFill>
+              <a:schemeClr val="accent6"/>
+            </a:solidFill>
+          </a:ln>
+        </p:spPr>
+        <p:style>
+          <a:lnRef idx="2">
+            <a:schemeClr val="accent1">
+              <a:shade val="50000"/>
+            </a:schemeClr>
+          </a:lnRef>
+          <a:fillRef idx="1">
+            <a:schemeClr val="accent1"/>
+          </a:fillRef>
+          <a:effectRef idx="0">
+            <a:schemeClr val="accent1"/>
+          </a:effectRef>
+          <a:fontRef idx="minor">
+            <a:schemeClr val="lt1"/>
+          </a:fontRef>
+        </p:style>
+        <p:txBody>
+          <a:bodyPr rtlCol="0" anchor="ctr"/>
+          <a:lstStyle/>
+          <a:p>
+            <a:pPr algn="ctr"/>
+            <a:r>
+              <a:rPr lang="da-DK" dirty="0">
+                <a:solidFill>
+                  <a:schemeClr val="tx1"/>
+                </a:solidFill>
+              </a:rPr>
+              <a:t>Data Access</a:t>
+            </a:r>
+            <a:endParaRPr lang="en-GB" dirty="0">
+              <a:solidFill>
+                <a:schemeClr val="tx1"/>
+              </a:solidFill>
+            </a:endParaRPr>
+          </a:p>
+        </p:txBody>
+      </p:sp>
+      <p:sp>
+        <p:nvSpPr>
+          <p:cNvPr id="9" name="Right Brace 8">
+            <a:extLst>
+              <a:ext uri="{FF2B5EF4-FFF2-40B4-BE49-F238E27FC236}">
+                <a16:creationId xmlns:a16="http://schemas.microsoft.com/office/drawing/2014/main" id="{6603F8FF-140D-417A-B37E-207DAD59B06F}"/>
+              </a:ext>
+            </a:extLst>
+          </p:cNvPr>
+          <p:cNvSpPr/>
+          <p:nvPr/>
+        </p:nvSpPr>
+        <p:spPr>
+          <a:xfrm>
+            <a:off x="7484533" y="2766135"/>
+            <a:ext cx="486139" cy="1072717"/>
+          </a:xfrm>
+          <a:prstGeom prst="rightBrace">
+            <a:avLst>
+              <a:gd name="adj1" fmla="val 8333"/>
+              <a:gd name="adj2" fmla="val 25533"/>
+            </a:avLst>
+          </a:prstGeom>
+        </p:spPr>
+        <p:style>
+          <a:lnRef idx="1">
+            <a:schemeClr val="accent1"/>
+          </a:lnRef>
+          <a:fillRef idx="0">
+            <a:schemeClr val="accent1"/>
+          </a:fillRef>
+          <a:effectRef idx="0">
+            <a:schemeClr val="accent1"/>
+          </a:effectRef>
+          <a:fontRef idx="minor">
+            <a:schemeClr val="tx1"/>
+          </a:fontRef>
+        </p:style>
+        <p:txBody>
+          <a:bodyPr rtlCol="0" anchor="ctr"/>
+          <a:lstStyle/>
+          <a:p>
+            <a:pPr algn="ctr"/>
+            <a:endParaRPr lang="en-GB"/>
+          </a:p>
+        </p:txBody>
+      </p:sp>
+      <p:sp>
+        <p:nvSpPr>
+          <p:cNvPr id="10" name="Right Brace 9">
+            <a:extLst>
+              <a:ext uri="{FF2B5EF4-FFF2-40B4-BE49-F238E27FC236}">
+                <a16:creationId xmlns:a16="http://schemas.microsoft.com/office/drawing/2014/main" id="{01A528C6-475B-4B0C-B67A-3BDDA46D0C9E}"/>
+              </a:ext>
+            </a:extLst>
+          </p:cNvPr>
+          <p:cNvSpPr/>
+          <p:nvPr/>
+        </p:nvSpPr>
+        <p:spPr>
+          <a:xfrm>
+            <a:off x="7421728" y="3272162"/>
+            <a:ext cx="486139" cy="1072717"/>
+          </a:xfrm>
+          <a:prstGeom prst="rightBrace">
+            <a:avLst>
+              <a:gd name="adj1" fmla="val 8333"/>
+              <a:gd name="adj2" fmla="val 66575"/>
+            </a:avLst>
+          </a:prstGeom>
+          <a:ln>
+            <a:solidFill>
+              <a:srgbClr val="7030A0"/>
+            </a:solidFill>
+          </a:ln>
+        </p:spPr>
+        <p:style>
+          <a:lnRef idx="1">
+            <a:schemeClr val="accent1"/>
+          </a:lnRef>
+          <a:fillRef idx="0">
+            <a:schemeClr val="accent1"/>
+          </a:fillRef>
+          <a:effectRef idx="0">
+            <a:schemeClr val="accent1"/>
+          </a:effectRef>
+          <a:fontRef idx="minor">
+            <a:schemeClr val="tx1"/>
+          </a:fontRef>
+        </p:style>
+        <p:txBody>
+          <a:bodyPr rtlCol="0" anchor="ctr"/>
+          <a:lstStyle/>
+          <a:p>
+            <a:pPr algn="ctr"/>
+            <a:endParaRPr lang="en-GB"/>
+          </a:p>
+        </p:txBody>
+      </p:sp>
+      <p:sp>
+        <p:nvSpPr>
+          <p:cNvPr id="11" name="TextBox 10">
+            <a:extLst>
+              <a:ext uri="{FF2B5EF4-FFF2-40B4-BE49-F238E27FC236}">
+                <a16:creationId xmlns:a16="http://schemas.microsoft.com/office/drawing/2014/main" id="{3AD60D34-3510-4D72-9F52-FD436F181953}"/>
+              </a:ext>
+            </a:extLst>
+          </p:cNvPr>
+          <p:cNvSpPr txBox="1"/>
+          <p:nvPr/>
+        </p:nvSpPr>
+        <p:spPr>
+          <a:xfrm>
+            <a:off x="8008078" y="2834482"/>
+            <a:ext cx="1337610" cy="369332"/>
+          </a:xfrm>
+          <a:prstGeom prst="rect">
+            <a:avLst/>
+          </a:prstGeom>
+          <a:noFill/>
+        </p:spPr>
+        <p:txBody>
+          <a:bodyPr wrap="none" rtlCol="0">
+            <a:spAutoFit/>
+          </a:bodyPr>
+          <a:lstStyle/>
+          <a:p>
+            <a:r>
+              <a:rPr lang="da-DK" dirty="0" err="1"/>
+              <a:t>Knows</a:t>
+            </a:r>
+            <a:r>
+              <a:rPr lang="da-DK" dirty="0"/>
+              <a:t> </a:t>
+            </a:r>
+            <a:r>
+              <a:rPr lang="da-DK" dirty="0" err="1"/>
+              <a:t>DTOs</a:t>
+            </a:r>
+            <a:endParaRPr lang="en-GB" dirty="0"/>
+          </a:p>
+        </p:txBody>
+      </p:sp>
+      <p:sp>
+        <p:nvSpPr>
+          <p:cNvPr id="12" name="TextBox 11">
+            <a:extLst>
+              <a:ext uri="{FF2B5EF4-FFF2-40B4-BE49-F238E27FC236}">
+                <a16:creationId xmlns:a16="http://schemas.microsoft.com/office/drawing/2014/main" id="{8C280AD1-3009-499C-873D-EFB6824ABF4E}"/>
+              </a:ext>
+            </a:extLst>
+          </p:cNvPr>
+          <p:cNvSpPr txBox="1"/>
+          <p:nvPr/>
+        </p:nvSpPr>
+        <p:spPr>
+          <a:xfrm>
+            <a:off x="7970668" y="3783196"/>
+            <a:ext cx="2294090" cy="369332"/>
+          </a:xfrm>
+          <a:prstGeom prst="rect">
+            <a:avLst/>
+          </a:prstGeom>
+          <a:noFill/>
+        </p:spPr>
+        <p:txBody>
+          <a:bodyPr wrap="none" rtlCol="0">
+            <a:spAutoFit/>
+          </a:bodyPr>
+          <a:lstStyle/>
+          <a:p>
+            <a:r>
+              <a:rPr lang="da-DK" dirty="0" err="1"/>
+              <a:t>Knows</a:t>
+            </a:r>
+            <a:r>
+              <a:rPr lang="da-DK" dirty="0"/>
+              <a:t> domain </a:t>
+            </a:r>
+            <a:r>
+              <a:rPr lang="da-DK" dirty="0" err="1"/>
+              <a:t>objects</a:t>
+            </a:r>
+            <a:endParaRPr lang="en-GB" dirty="0"/>
+          </a:p>
+        </p:txBody>
+      </p:sp>
     </p:spTree>
     <p:extLst>
       <p:ext uri="{BB962C8B-B14F-4D97-AF65-F5344CB8AC3E}">

</xml_diff>